<commit_message>
some change put mailjet api for mail add fav
</commit_message>
<xml_diff>
--- a/partie_dev_front/Cahier des charges.pptx
+++ b/partie_dev_front/Cahier des charges.pptx
@@ -230,7 +230,7 @@
           <a:p>
             <a:fld id="{C93DFBC3-323C-4D52-A2D2-D7C31660ADC8}" type="datetimeFigureOut">
               <a:rPr lang="fr-FR" smtClean="0"/>
-              <a:t>13/10/2020</a:t>
+              <a:t>07/12/2020</a:t>
             </a:fld>
             <a:endParaRPr lang="fr-FR"/>
           </a:p>
@@ -408,7 +408,7 @@
           <a:p>
             <a:fld id="{1CF1866C-E72D-4055-8E7C-5F83F78A261B}" type="datetimeFigureOut">
               <a:rPr lang="fr-FR" noProof="0" smtClean="0"/>
-              <a:t>13/10/2020</a:t>
+              <a:t>07/12/2020</a:t>
             </a:fld>
             <a:endParaRPr lang="fr-FR" noProof="0"/>
           </a:p>
@@ -913,7 +913,7 @@
             <a:pPr rtl="0"/>
             <a:fld id="{006A08F9-C7D9-400D-AA82-205C6B803E93}" type="datetime1">
               <a:rPr lang="fr-FR" noProof="0" smtClean="0"/>
-              <a:t>13/10/2020</a:t>
+              <a:t>07/12/2020</a:t>
             </a:fld>
             <a:endParaRPr lang="fr-FR" noProof="0"/>
           </a:p>
@@ -1162,7 +1162,7 @@
             <a:pPr rtl="0"/>
             <a:fld id="{AD774555-D1D4-4025-ACBC-652E1CC897A8}" type="datetime1">
               <a:rPr lang="fr-FR" noProof="0" smtClean="0"/>
-              <a:t>13/10/2020</a:t>
+              <a:t>07/12/2020</a:t>
             </a:fld>
             <a:endParaRPr lang="fr-FR" noProof="0"/>
           </a:p>
@@ -1348,7 +1348,7 @@
             <a:pPr rtl="0"/>
             <a:fld id="{158F8F2B-E5CE-4E61-8800-C61D5F379411}" type="datetime1">
               <a:rPr lang="fr-FR" noProof="0" smtClean="0"/>
-              <a:t>13/10/2020</a:t>
+              <a:t>07/12/2020</a:t>
             </a:fld>
             <a:endParaRPr lang="fr-FR" noProof="0"/>
           </a:p>
@@ -1559,7 +1559,7 @@
             <a:pPr rtl="0"/>
             <a:fld id="{A09384FD-A7E9-4177-9978-708A4ACEB482}" type="datetime1">
               <a:rPr lang="fr-FR" noProof="0" smtClean="0"/>
-              <a:t>13/10/2020</a:t>
+              <a:t>07/12/2020</a:t>
             </a:fld>
             <a:endParaRPr lang="fr-FR" noProof="0"/>
           </a:p>
@@ -1823,7 +1823,7 @@
             <a:pPr rtl="0"/>
             <a:fld id="{27AEEE63-E1C0-4BF0-AEA5-A3BC3775A391}" type="datetime1">
               <a:rPr lang="fr-FR" noProof="0" smtClean="0"/>
-              <a:t>13/10/2020</a:t>
+              <a:t>07/12/2020</a:t>
             </a:fld>
             <a:endParaRPr lang="fr-FR" noProof="0"/>
           </a:p>
@@ -2175,7 +2175,7 @@
             <a:pPr rtl="0"/>
             <a:fld id="{F024AEAA-2C4A-4A09-9E05-FA99B9AFD774}" type="datetime1">
               <a:rPr lang="fr-FR" noProof="0" smtClean="0"/>
-              <a:t>13/10/2020</a:t>
+              <a:t>07/12/2020</a:t>
             </a:fld>
             <a:endParaRPr lang="fr-FR" noProof="0"/>
           </a:p>
@@ -2582,7 +2582,7 @@
             <a:pPr rtl="0"/>
             <a:fld id="{95683649-3B0C-4B5C-AF4E-FBE12D598A79}" type="datetime1">
               <a:rPr lang="fr-FR" noProof="0" smtClean="0"/>
-              <a:t>13/10/2020</a:t>
+              <a:t>07/12/2020</a:t>
             </a:fld>
             <a:endParaRPr lang="fr-FR" noProof="0"/>
           </a:p>
@@ -2707,7 +2707,7 @@
             <a:pPr rtl="0"/>
             <a:fld id="{DE602C71-7026-4D07-890D-4A9F657DE5FB}" type="datetime1">
               <a:rPr lang="fr-FR" noProof="0" smtClean="0"/>
-              <a:t>13/10/2020</a:t>
+              <a:t>07/12/2020</a:t>
             </a:fld>
             <a:endParaRPr lang="fr-FR" noProof="0"/>
           </a:p>
@@ -2809,7 +2809,7 @@
             <a:pPr rtl="0"/>
             <a:fld id="{30520FAC-9451-47BB-8512-F37BB60EF965}" type="datetime1">
               <a:rPr lang="fr-FR" noProof="0" smtClean="0"/>
-              <a:t>13/10/2020</a:t>
+              <a:t>07/12/2020</a:t>
             </a:fld>
             <a:endParaRPr lang="fr-FR" noProof="0"/>
           </a:p>
@@ -3105,7 +3105,7 @@
             <a:pPr rtl="0"/>
             <a:fld id="{5E467A5C-3B21-453E-B7E8-725A31D61AF7}" type="datetime1">
               <a:rPr lang="fr-FR" noProof="0" smtClean="0"/>
-              <a:t>13/10/2020</a:t>
+              <a:t>07/12/2020</a:t>
             </a:fld>
             <a:endParaRPr lang="fr-FR" noProof="0"/>
           </a:p>
@@ -3392,7 +3392,7 @@
             <a:pPr rtl="0"/>
             <a:fld id="{E9F30D80-A32A-4D1A-8029-28694813762D}" type="datetime1">
               <a:rPr lang="fr-FR" noProof="0" smtClean="0"/>
-              <a:t>13/10/2020</a:t>
+              <a:t>07/12/2020</a:t>
             </a:fld>
             <a:endParaRPr lang="fr-FR" noProof="0"/>
           </a:p>
@@ -3648,7 +3648,7 @@
             <a:pPr rtl="0"/>
             <a:fld id="{3A84AF93-9017-4662-A07A-5BAAFEF544E9}" type="datetime1">
               <a:rPr lang="fr-FR" noProof="0" smtClean="0"/>
-              <a:t>13/10/2020</a:t>
+              <a:t>07/12/2020</a:t>
             </a:fld>
             <a:endParaRPr lang="fr-FR" noProof="0"/>
           </a:p>
@@ -4144,6 +4144,14 @@
 <file path=ppt/slides/slide1.xml><?xml version="1.0" encoding="utf-8"?>
 <p:sld xmlns:a="http://schemas.openxmlformats.org/drawingml/2006/main" xmlns:r="http://schemas.openxmlformats.org/officeDocument/2006/relationships" xmlns:p="http://schemas.openxmlformats.org/presentationml/2006/main">
   <p:cSld>
+    <p:bg>
+      <p:bgPr>
+        <a:solidFill>
+          <a:srgbClr val="13A8D9"/>
+        </a:solidFill>
+        <a:effectLst/>
+      </p:bgPr>
+    </p:bg>
     <p:spTree>
       <p:nvGrpSpPr>
         <p:cNvPr id="1" name=""/>
@@ -4368,7 +4376,7 @@
         </p:spPr>
         <p:txBody>
           <a:bodyPr lIns="0" rIns="0" rtlCol="0" anchor="t">
-            <a:normAutofit fontScale="40000" lnSpcReduction="20000"/>
+            <a:normAutofit fontScale="55000" lnSpcReduction="20000"/>
           </a:bodyPr>
           <a:lstStyle/>
           <a:p>
@@ -4429,78 +4437,21 @@
           </a:p>
           <a:p>
             <a:pPr algn="just" rtl="0"/>
-            <a:r>
-              <a:rPr lang="fr-FR" sz="2800" dirty="0" err="1">
-                <a:solidFill>
-                  <a:srgbClr val="759672"/>
-                </a:solidFill>
-              </a:rPr>
-              <a:t>Euripole</a:t>
-            </a:r>
+            <a:endParaRPr lang="fr-FR" sz="2800" dirty="0">
+              <a:solidFill>
+                <a:srgbClr val="759672"/>
+              </a:solidFill>
+            </a:endParaRPr>
+          </a:p>
+          <a:p>
+            <a:pPr algn="just" rtl="0"/>
             <a:r>
               <a:rPr lang="fr-FR" sz="2800" dirty="0">
                 <a:solidFill>
                   <a:srgbClr val="759672"/>
                 </a:solidFill>
               </a:rPr>
-              <a:t> business center </a:t>
-            </a:r>
-          </a:p>
-          <a:p>
-            <a:pPr algn="just" rtl="0"/>
-            <a:r>
-              <a:rPr lang="fr-FR" sz="2800" dirty="0">
-                <a:solidFill>
-                  <a:srgbClr val="759672"/>
-                </a:solidFill>
-              </a:rPr>
-              <a:t>Zac des </a:t>
-            </a:r>
-            <a:r>
-              <a:rPr lang="fr-FR" sz="2800" dirty="0" err="1">
-                <a:solidFill>
-                  <a:srgbClr val="759672"/>
-                </a:solidFill>
-              </a:rPr>
-              <a:t>vauguillettes</a:t>
-            </a:r>
-            <a:r>
-              <a:rPr lang="fr-FR" sz="2800" dirty="0">
-                <a:solidFill>
-                  <a:srgbClr val="759672"/>
-                </a:solidFill>
-              </a:rPr>
-              <a:t> III 17 rue de Sancey</a:t>
-            </a:r>
-          </a:p>
-          <a:p>
-            <a:pPr algn="just" rtl="0"/>
-            <a:r>
-              <a:rPr lang="fr-FR" sz="2800" dirty="0">
-                <a:solidFill>
-                  <a:srgbClr val="759672"/>
-                </a:solidFill>
-              </a:rPr>
-              <a:t>89000 Sens</a:t>
-            </a:r>
-          </a:p>
-          <a:p>
-            <a:pPr algn="just" rtl="0"/>
-            <a:endParaRPr lang="fr-FR" sz="2800" dirty="0">
-              <a:solidFill>
-                <a:srgbClr val="759672"/>
-              </a:solidFill>
-            </a:endParaRPr>
-          </a:p>
-          <a:p>
-            <a:pPr algn="just" rtl="0"/>
-            <a:r>
-              <a:rPr lang="fr-FR" sz="2800" dirty="0">
-                <a:solidFill>
-                  <a:srgbClr val="759672"/>
-                </a:solidFill>
-              </a:rPr>
-              <a:t>Contact: Mr Hoffman </a:t>
+              <a:t>Contact: Mr Rossi Sébastien</a:t>
             </a:r>
           </a:p>
           <a:p>
@@ -4735,10 +4686,10 @@
       </p:sp>
       <p:pic>
         <p:nvPicPr>
-          <p:cNvPr id="6" name="Image 5">
+          <p:cNvPr id="8" name="Image 7">
             <a:extLst>
               <a:ext uri="{FF2B5EF4-FFF2-40B4-BE49-F238E27FC236}">
-                <a16:creationId xmlns:a16="http://schemas.microsoft.com/office/drawing/2014/main" id="{C659EA02-9D53-421E-9D33-2AD8AC48A92F}"/>
+                <a16:creationId xmlns:a16="http://schemas.microsoft.com/office/drawing/2014/main" id="{1BF39EF2-6F69-45A3-9BCF-732BED80A7AC}"/>
               </a:ext>
             </a:extLst>
           </p:cNvPr>
@@ -4755,8 +4706,8 @@
         </p:blipFill>
         <p:spPr>
           <a:xfrm>
-            <a:off x="1867648" y="3855692"/>
-            <a:ext cx="1638232" cy="591022"/>
+            <a:off x="2101942" y="3855692"/>
+            <a:ext cx="1264664" cy="632332"/>
           </a:xfrm>
           <a:prstGeom prst="rect">
             <a:avLst/>
@@ -4782,7 +4733,7 @@
     <p:bg>
       <p:bgPr>
         <a:solidFill>
-          <a:srgbClr val="759672"/>
+          <a:srgbClr val="13A8D9"/>
         </a:solidFill>
         <a:effectLst/>
       </p:bgPr>
@@ -5301,7 +5252,7 @@
     <p:bg>
       <p:bgPr>
         <a:solidFill>
-          <a:srgbClr val="759672"/>
+          <a:srgbClr val="13A8D9"/>
         </a:solidFill>
         <a:effectLst/>
       </p:bgPr>
@@ -5518,7 +5469,7 @@
     <p:bg>
       <p:bgPr>
         <a:solidFill>
-          <a:srgbClr val="759672"/>
+          <a:srgbClr val="13A8D9"/>
         </a:solidFill>
         <a:effectLst/>
       </p:bgPr>
@@ -5593,119 +5544,21 @@
           </a:p>
           <a:p>
             <a:r>
-              <a:rPr lang="fr-FR" dirty="0" err="1"/>
-              <a:t>Euripole</a:t>
-            </a:r>
-            <a:r>
               <a:rPr lang="fr-FR" dirty="0"/>
-              <a:t> business center est une société basé a Sens. Qui regroupe plusieurs branche allant de la création d’entreprise jusqu’à la domiciliation mais aussi la location d’espace de travail mais aussi d’espace de réunion.</a:t>
-            </a:r>
+              <a:t>Crée ta boite est une application destiné au Chambre des Métiers ou au  Chambre du Commerce et de l’Industrie afin de facilité le travail des pôles créations d’entreprise.</a:t>
+            </a:r>
+          </a:p>
+          <a:p>
+            <a:endParaRPr lang="fr-FR" dirty="0"/>
           </a:p>
           <a:p>
             <a:r>
               <a:rPr lang="fr-FR" dirty="0"/>
-              <a:t>La société est actuellement dirigé par Mr Hoffman qui apporte sont expertise en création d’entreprise.</a:t>
-            </a:r>
-          </a:p>
-          <a:p>
-            <a:r>
-              <a:rPr lang="fr-FR" dirty="0"/>
-              <a:t>La société en quelques chiffres:</a:t>
-            </a:r>
-          </a:p>
-          <a:p>
-            <a:endParaRPr lang="fr-FR" dirty="0"/>
-          </a:p>
-          <a:p>
-            <a:pPr lvl="4"/>
-            <a:r>
-              <a:rPr lang="fr-FR" dirty="0"/>
-              <a:t>Plus de 60 entreprises en 		    1000 m² de bureau</a:t>
-            </a:r>
-          </a:p>
-          <a:p>
-            <a:pPr marL="640080" lvl="4" indent="0">
-              <a:buNone/>
-            </a:pPr>
-            <a:r>
-              <a:rPr lang="fr-FR" dirty="0"/>
-              <a:t>domiciliation </a:t>
-            </a:r>
-          </a:p>
-        </p:txBody>
-      </p:sp>
-      <p:pic>
-        <p:nvPicPr>
-          <p:cNvPr id="5" name="Graphique 4" descr="TVA">
-            <a:extLst>
-              <a:ext uri="{FF2B5EF4-FFF2-40B4-BE49-F238E27FC236}">
-                <a16:creationId xmlns:a16="http://schemas.microsoft.com/office/drawing/2014/main" id="{3CA556A5-0451-4E8B-BCD2-55578C56A148}"/>
-              </a:ext>
-            </a:extLst>
-          </p:cNvPr>
-          <p:cNvPicPr>
-            <a:picLocks noChangeAspect="1"/>
-          </p:cNvPicPr>
-          <p:nvPr/>
-        </p:nvPicPr>
-        <p:blipFill>
-          <a:blip r:embed="rId2">
-            <a:extLst>
-              <a:ext uri="{96DAC541-7B7A-43D3-8B79-37D633B846F1}">
-                <asvg:svgBlip xmlns:asvg="http://schemas.microsoft.com/office/drawing/2016/SVG/main" r:embed="rId3"/>
-              </a:ext>
-            </a:extLst>
-          </a:blip>
-          <a:stretch>
-            <a:fillRect/>
-          </a:stretch>
-        </p:blipFill>
-        <p:spPr>
-          <a:xfrm>
-            <a:off x="1024128" y="5304452"/>
-            <a:ext cx="715346" cy="715346"/>
-          </a:xfrm>
-          <a:prstGeom prst="rect">
-            <a:avLst/>
-          </a:prstGeom>
-        </p:spPr>
-      </p:pic>
-      <p:pic>
-        <p:nvPicPr>
-          <p:cNvPr id="7" name="Graphique 6" descr="Bâtiment">
-            <a:extLst>
-              <a:ext uri="{FF2B5EF4-FFF2-40B4-BE49-F238E27FC236}">
-                <a16:creationId xmlns:a16="http://schemas.microsoft.com/office/drawing/2014/main" id="{BFE49CA3-8358-4C7D-9932-22C6C7338B5C}"/>
-              </a:ext>
-            </a:extLst>
-          </p:cNvPr>
-          <p:cNvPicPr>
-            <a:picLocks noChangeAspect="1"/>
-          </p:cNvPicPr>
-          <p:nvPr/>
-        </p:nvPicPr>
-        <p:blipFill>
-          <a:blip r:embed="rId4">
-            <a:extLst>
-              <a:ext uri="{96DAC541-7B7A-43D3-8B79-37D633B846F1}">
-                <asvg:svgBlip xmlns:asvg="http://schemas.microsoft.com/office/drawing/2016/SVG/main" r:embed="rId5"/>
-              </a:ext>
-            </a:extLst>
-          </a:blip>
-          <a:stretch>
-            <a:fillRect/>
-          </a:stretch>
-        </p:blipFill>
-        <p:spPr>
-          <a:xfrm>
-            <a:off x="4351175" y="5304452"/>
-            <a:ext cx="715346" cy="715346"/>
-          </a:xfrm>
-          <a:prstGeom prst="rect">
-            <a:avLst/>
-          </a:prstGeom>
-        </p:spPr>
-      </p:pic>
+              <a:t>Cette application offres par la même un espace de travail pour le contrôle l’édition et le suivi des dossiers </a:t>
+            </a:r>
+          </a:p>
+        </p:txBody>
+      </p:sp>
     </p:spTree>
     <p:extLst>
       <p:ext uri="{BB962C8B-B14F-4D97-AF65-F5344CB8AC3E}">
@@ -5725,7 +5578,7 @@
     <p:bg>
       <p:bgPr>
         <a:solidFill>
-          <a:srgbClr val="759672"/>
+          <a:srgbClr val="13A8D9"/>
         </a:solidFill>
         <a:effectLst/>
       </p:bgPr>
@@ -5830,23 +5683,6 @@
               <a:rPr lang="fr-FR" dirty="0"/>
               <a:t>Nous désirons aussi un visuel de différents points stratégique pour nous.</a:t>
             </a:r>
-          </a:p>
-          <a:p>
-            <a:r>
-              <a:rPr lang="fr-FR" dirty="0"/>
-              <a:t>Nous possédons déjà un site internet que </a:t>
-            </a:r>
-            <a:r>
-              <a:rPr lang="fr-FR" dirty="0" err="1"/>
-              <a:t>voius</a:t>
-            </a:r>
-            <a:r>
-              <a:rPr lang="fr-FR" dirty="0"/>
-              <a:t> trouverez à l’adresse suivante: euripole.fr </a:t>
-            </a:r>
-          </a:p>
-          <a:p>
-            <a:endParaRPr lang="fr-FR" dirty="0"/>
           </a:p>
         </p:txBody>
       </p:sp>
@@ -5869,7 +5705,7 @@
     <p:bg>
       <p:bgPr>
         <a:solidFill>
-          <a:srgbClr val="759672"/>
+          <a:srgbClr val="13A8D9"/>
         </a:solidFill>
         <a:effectLst/>
       </p:bgPr>
@@ -5981,7 +5817,7 @@
     <p:bg>
       <p:bgPr>
         <a:solidFill>
-          <a:srgbClr val="759672"/>
+          <a:srgbClr val="13A8D9"/>
         </a:solidFill>
         <a:effectLst/>
       </p:bgPr>
@@ -6332,55 +6168,7 @@
                   <a:srgbClr val="FFFFFF"/>
                 </a:solidFill>
               </a:rPr>
-              <a:t> . </a:t>
-            </a:r>
-            <a:r>
-              <a:rPr lang="en-US" dirty="0" err="1">
-                <a:solidFill>
-                  <a:srgbClr val="FFFFFF"/>
-                </a:solidFill>
-              </a:rPr>
-              <a:t>Mais</a:t>
-            </a:r>
-            <a:r>
-              <a:rPr lang="en-US" dirty="0">
-                <a:solidFill>
-                  <a:srgbClr val="FFFFFF"/>
-                </a:solidFill>
-              </a:rPr>
-              <a:t> </a:t>
-            </a:r>
-            <a:r>
-              <a:rPr lang="en-US" dirty="0" err="1">
-                <a:solidFill>
-                  <a:srgbClr val="FFFFFF"/>
-                </a:solidFill>
-              </a:rPr>
-              <a:t>aussi</a:t>
-            </a:r>
-            <a:r>
-              <a:rPr lang="en-US" dirty="0">
-                <a:solidFill>
-                  <a:srgbClr val="FFFFFF"/>
-                </a:solidFill>
-              </a:rPr>
-              <a:t> nous </a:t>
-            </a:r>
-            <a:r>
-              <a:rPr lang="en-US" dirty="0" err="1">
-                <a:solidFill>
-                  <a:srgbClr val="FFFFFF"/>
-                </a:solidFill>
-              </a:rPr>
-              <a:t>même</a:t>
-            </a:r>
-            <a:r>
-              <a:rPr lang="en-US" dirty="0">
-                <a:solidFill>
-                  <a:srgbClr val="FFFFFF"/>
-                </a:solidFill>
-              </a:rPr>
-              <a:t>.</a:t>
+              <a:t> .</a:t>
             </a:r>
           </a:p>
         </p:txBody>
@@ -6439,7 +6227,7 @@
     <p:bg>
       <p:bgPr>
         <a:solidFill>
-          <a:srgbClr val="759672"/>
+          <a:srgbClr val="13A8D9"/>
         </a:solidFill>
         <a:effectLst/>
       </p:bgPr>
@@ -6584,7 +6372,7 @@
     <p:bg>
       <p:bgPr>
         <a:solidFill>
-          <a:schemeClr val="bg1"/>
+          <a:srgbClr val="13A8D9"/>
         </a:solidFill>
         <a:effectLst/>
       </p:bgPr>
@@ -6820,7 +6608,7 @@
             </a:pPr>
             <a:r>
               <a:rPr lang="fr-FR" dirty="0"/>
-              <a:t>#759672		                # FFFFF</a:t>
+              <a:t>#0c8284		                # FFFFB</a:t>
             </a:r>
           </a:p>
           <a:p>
@@ -6829,7 +6617,7 @@
             </a:pPr>
             <a:r>
               <a:rPr lang="fr-FR" dirty="0"/>
-              <a:t>RGB: 117 150 114 	               RGB : 255 255 255	</a:t>
+              <a:t>RGB: 12 130 132 	               RGB : 255 255 251	</a:t>
             </a:r>
           </a:p>
           <a:p>
@@ -6878,7 +6666,7 @@
             <a:avLst/>
           </a:prstGeom>
           <a:solidFill>
-            <a:srgbClr val="759672"/>
+            <a:srgbClr val="0C8284"/>
           </a:solidFill>
         </p:spPr>
         <p:style>
@@ -6902,7 +6690,7 @@
           <a:lstStyle/>
           <a:p>
             <a:pPr algn="ctr"/>
-            <a:endParaRPr lang="fr-FR"/>
+            <a:endParaRPr lang="fr-FR" dirty="0"/>
           </a:p>
         </p:txBody>
       </p:sp>
@@ -6927,7 +6715,7 @@
             <a:avLst/>
           </a:prstGeom>
           <a:solidFill>
-            <a:schemeClr val="tx1"/>
+            <a:srgbClr val="FFFFFB"/>
           </a:solidFill>
         </p:spPr>
         <p:style>
@@ -6974,7 +6762,7 @@
     <p:bg>
       <p:bgPr>
         <a:solidFill>
-          <a:srgbClr val="759672"/>
+          <a:srgbClr val="13A8D9"/>
         </a:solidFill>
         <a:effectLst/>
       </p:bgPr>
@@ -8133,20 +7921,20 @@
 </file>
 
 <file path=customXml/item2.xml><?xml version="1.0" encoding="utf-8"?>
+<p:properties xmlns:p="http://schemas.microsoft.com/office/2006/metadata/properties" xmlns:xsi="http://www.w3.org/2001/XMLSchema-instance" xmlns:pc="http://schemas.microsoft.com/office/infopath/2007/PartnerControls">
+  <documentManagement>
+    <MediaServiceKeyPoints xmlns="71af3243-3dd4-4a8d-8c0d-dd76da1f02a5" xsi:nil="true"/>
+  </documentManagement>
+</p:properties>
+</file>
+
+<file path=customXml/item3.xml><?xml version="1.0" encoding="utf-8"?>
 <?mso-contentType ?>
 <FormTemplates xmlns="http://schemas.microsoft.com/sharepoint/v3/contenttype/forms">
   <Display>DocumentLibraryForm</Display>
   <Edit>DocumentLibraryForm</Edit>
   <New>DocumentLibraryForm</New>
 </FormTemplates>
-</file>
-
-<file path=customXml/item3.xml><?xml version="1.0" encoding="utf-8"?>
-<p:properties xmlns:p="http://schemas.microsoft.com/office/2006/metadata/properties" xmlns:xsi="http://www.w3.org/2001/XMLSchema-instance" xmlns:pc="http://schemas.microsoft.com/office/infopath/2007/PartnerControls">
-  <documentManagement>
-    <MediaServiceKeyPoints xmlns="71af3243-3dd4-4a8d-8c0d-dd76da1f02a5" xsi:nil="true"/>
-  </documentManagement>
-</p:properties>
 </file>
 
 <file path=customXml/itemProps1.xml><?xml version="1.0" encoding="utf-8"?>
@@ -8169,14 +7957,6 @@
 </file>
 
 <file path=customXml/itemProps2.xml><?xml version="1.0" encoding="utf-8"?>
-<ds:datastoreItem xmlns:ds="http://schemas.openxmlformats.org/officeDocument/2006/customXml" ds:itemID="{3ADE682D-B6B9-42D0-88B0-65F09B3D7CEF}">
-  <ds:schemaRefs>
-    <ds:schemaRef ds:uri="http://schemas.microsoft.com/sharepoint/v3/contenttype/forms"/>
-  </ds:schemaRefs>
-</ds:datastoreItem>
-</file>
-
-<file path=customXml/itemProps3.xml><?xml version="1.0" encoding="utf-8"?>
 <ds:datastoreItem xmlns:ds="http://schemas.openxmlformats.org/officeDocument/2006/customXml" ds:itemID="{C10F7A41-B1D0-4876-B6D4-D0473498FCF9}">
   <ds:schemaRefs>
     <ds:schemaRef ds:uri="http://schemas.microsoft.com/office/2006/metadata/properties"/>
@@ -8184,4 +7964,12 @@
     <ds:schemaRef ds:uri="71af3243-3dd4-4a8d-8c0d-dd76da1f02a5"/>
   </ds:schemaRefs>
 </ds:datastoreItem>
+</file>
+
+<file path=customXml/itemProps3.xml><?xml version="1.0" encoding="utf-8"?>
+<ds:datastoreItem xmlns:ds="http://schemas.openxmlformats.org/officeDocument/2006/customXml" ds:itemID="{3ADE682D-B6B9-42D0-88B0-65F09B3D7CEF}">
+  <ds:schemaRefs>
+    <ds:schemaRef ds:uri="http://schemas.microsoft.com/sharepoint/v3/contenttype/forms"/>
+  </ds:schemaRefs>
+</ds:datastoreItem>
 </file>
</xml_diff>